<commit_message>
update ppp and aboutus
</commit_message>
<xml_diff>
--- a/docs/diagrams/FindSequenceDiagram.pptx
+++ b/docs/diagrams/FindSequenceDiagram.pptx
@@ -229,7 +229,7 @@
           <a:p>
             <a:fld id="{DBE7FD63-F9CD-C546-9F01-3927817E19E0}" type="datetimeFigureOut">
               <a:rPr lang="en-US" smtClean="0"/>
-              <a:t>11/9/19</a:t>
+              <a:t>11/11/2019</a:t>
             </a:fld>
             <a:endParaRPr lang="en-US"/>
           </a:p>
@@ -730,7 +730,7 @@
           <a:p>
             <a:fld id="{57356453-1829-2C4D-909B-CF3D09E03A3B}" type="datetimeFigureOut">
               <a:rPr lang="en-US" smtClean="0"/>
-              <a:t>11/9/19</a:t>
+              <a:t>11/11/2019</a:t>
             </a:fld>
             <a:endParaRPr lang="en-US"/>
           </a:p>
@@ -930,7 +930,7 @@
           <a:p>
             <a:fld id="{57356453-1829-2C4D-909B-CF3D09E03A3B}" type="datetimeFigureOut">
               <a:rPr lang="en-US" smtClean="0"/>
-              <a:t>11/9/19</a:t>
+              <a:t>11/11/2019</a:t>
             </a:fld>
             <a:endParaRPr lang="en-US"/>
           </a:p>
@@ -1140,7 +1140,7 @@
           <a:p>
             <a:fld id="{57356453-1829-2C4D-909B-CF3D09E03A3B}" type="datetimeFigureOut">
               <a:rPr lang="en-US" smtClean="0"/>
-              <a:t>11/9/19</a:t>
+              <a:t>11/11/2019</a:t>
             </a:fld>
             <a:endParaRPr lang="en-US"/>
           </a:p>
@@ -1340,7 +1340,7 @@
           <a:p>
             <a:fld id="{57356453-1829-2C4D-909B-CF3D09E03A3B}" type="datetimeFigureOut">
               <a:rPr lang="en-US" smtClean="0"/>
-              <a:t>11/9/19</a:t>
+              <a:t>11/11/2019</a:t>
             </a:fld>
             <a:endParaRPr lang="en-US"/>
           </a:p>
@@ -1616,7 +1616,7 @@
           <a:p>
             <a:fld id="{57356453-1829-2C4D-909B-CF3D09E03A3B}" type="datetimeFigureOut">
               <a:rPr lang="en-US" smtClean="0"/>
-              <a:t>11/9/19</a:t>
+              <a:t>11/11/2019</a:t>
             </a:fld>
             <a:endParaRPr lang="en-US"/>
           </a:p>
@@ -1884,7 +1884,7 @@
           <a:p>
             <a:fld id="{57356453-1829-2C4D-909B-CF3D09E03A3B}" type="datetimeFigureOut">
               <a:rPr lang="en-US" smtClean="0"/>
-              <a:t>11/9/19</a:t>
+              <a:t>11/11/2019</a:t>
             </a:fld>
             <a:endParaRPr lang="en-US"/>
           </a:p>
@@ -2299,7 +2299,7 @@
           <a:p>
             <a:fld id="{57356453-1829-2C4D-909B-CF3D09E03A3B}" type="datetimeFigureOut">
               <a:rPr lang="en-US" smtClean="0"/>
-              <a:t>11/9/19</a:t>
+              <a:t>11/11/2019</a:t>
             </a:fld>
             <a:endParaRPr lang="en-US"/>
           </a:p>
@@ -2441,7 +2441,7 @@
           <a:p>
             <a:fld id="{57356453-1829-2C4D-909B-CF3D09E03A3B}" type="datetimeFigureOut">
               <a:rPr lang="en-US" smtClean="0"/>
-              <a:t>11/9/19</a:t>
+              <a:t>11/11/2019</a:t>
             </a:fld>
             <a:endParaRPr lang="en-US"/>
           </a:p>
@@ -2554,7 +2554,7 @@
           <a:p>
             <a:fld id="{57356453-1829-2C4D-909B-CF3D09E03A3B}" type="datetimeFigureOut">
               <a:rPr lang="en-US" smtClean="0"/>
-              <a:t>11/9/19</a:t>
+              <a:t>11/11/2019</a:t>
             </a:fld>
             <a:endParaRPr lang="en-US"/>
           </a:p>
@@ -2867,7 +2867,7 @@
           <a:p>
             <a:fld id="{57356453-1829-2C4D-909B-CF3D09E03A3B}" type="datetimeFigureOut">
               <a:rPr lang="en-US" smtClean="0"/>
-              <a:t>11/9/19</a:t>
+              <a:t>11/11/2019</a:t>
             </a:fld>
             <a:endParaRPr lang="en-US"/>
           </a:p>
@@ -3156,7 +3156,7 @@
           <a:p>
             <a:fld id="{57356453-1829-2C4D-909B-CF3D09E03A3B}" type="datetimeFigureOut">
               <a:rPr lang="en-US" smtClean="0"/>
-              <a:t>11/9/19</a:t>
+              <a:t>11/11/2019</a:t>
             </a:fld>
             <a:endParaRPr lang="en-US"/>
           </a:p>
@@ -3399,7 +3399,7 @@
           <a:p>
             <a:fld id="{57356453-1829-2C4D-909B-CF3D09E03A3B}" type="datetimeFigureOut">
               <a:rPr lang="en-US" smtClean="0"/>
-              <a:t>11/9/19</a:t>
+              <a:t>11/11/2019</a:t>
             </a:fld>
             <a:endParaRPr lang="en-US"/>
           </a:p>
@@ -5565,7 +5565,7 @@
             </p:nvSpPr>
             <p:spPr>
               <a:xfrm>
-                <a:off x="6326171" y="4023883"/>
+                <a:off x="6221370" y="4069449"/>
                 <a:ext cx="1157689" cy="261610"/>
               </a:xfrm>
               <a:prstGeom prst="rect">
@@ -6516,7 +6516,7 @@
             </p:nvSpPr>
             <p:spPr>
               <a:xfrm>
-                <a:off x="6072970" y="3567603"/>
+                <a:off x="5928152" y="3726270"/>
                 <a:ext cx="1508746" cy="430887"/>
               </a:xfrm>
               <a:prstGeom prst="rect">

</xml_diff>